<commit_message>
resource remaking and add to Tile processing
resource remaking and add to Tile processing
</commit_message>
<xml_diff>
--- a/2012182037 정재훈 2차발표자료.pptx
+++ b/2012182037 정재훈 2차발표자료.pptx
@@ -3196,24 +3196,7 @@
                 <a:latin typeface="08서울한강체 L" pitchFamily="18" charset="-127"/>
                 <a:ea typeface="08서울한강체 L" pitchFamily="18" charset="-127"/>
               </a:rPr>
-              <a:t>차 </a:t>
-            </a:r>
-            <a:r>
-              <a:rPr lang="ko-KR" altLang="en-US" sz="3000" dirty="0" smtClean="0">
-                <a:ln>
-                  <a:solidFill>
-                    <a:srgbClr val="E6005D">
-                      <a:alpha val="25000"/>
-                    </a:srgbClr>
-                  </a:solidFill>
-                </a:ln>
-                <a:solidFill>
-                  <a:srgbClr val="E6005D"/>
-                </a:solidFill>
-                <a:latin typeface="08서울한강체 L" pitchFamily="18" charset="-127"/>
-                <a:ea typeface="08서울한강체 L" pitchFamily="18" charset="-127"/>
-              </a:rPr>
-              <a:t>발표 자료</a:t>
+              <a:t>차 발표 자료</a:t>
             </a:r>
             <a:endParaRPr lang="ko-KR" altLang="en-US" sz="3000" dirty="0">
               <a:ln>
@@ -4373,24 +4356,7 @@
                 <a:latin typeface="08서울한강체 M" pitchFamily="18" charset="-127"/>
                 <a:ea typeface="08서울한강체 M" pitchFamily="18" charset="-127"/>
               </a:rPr>
-              <a:t>Git</a:t>
-            </a:r>
-            <a:r>
-              <a:rPr lang="en-US" altLang="ko-KR" sz="2500" dirty="0" err="1" smtClean="0">
-                <a:ln>
-                  <a:solidFill>
-                    <a:srgbClr val="E6005D">
-                      <a:alpha val="25000"/>
-                    </a:srgbClr>
-                  </a:solidFill>
-                </a:ln>
-                <a:solidFill>
-                  <a:srgbClr val="E6005D"/>
-                </a:solidFill>
-                <a:latin typeface="08서울한강체 M" pitchFamily="18" charset="-127"/>
-                <a:ea typeface="08서울한강체 M" pitchFamily="18" charset="-127"/>
-              </a:rPr>
-              <a:t>Hub</a:t>
+              <a:t>GitHub</a:t>
             </a:r>
             <a:r>
               <a:rPr lang="en-US" altLang="ko-KR" sz="2500" dirty="0" smtClean="0">
@@ -4409,20 +4375,6 @@
               </a:rPr>
               <a:t> Commit</a:t>
             </a:r>
-            <a:endParaRPr lang="en-US" altLang="ko-KR" sz="2500" dirty="0" smtClean="0">
-              <a:ln>
-                <a:solidFill>
-                  <a:srgbClr val="E6005D">
-                    <a:alpha val="25000"/>
-                  </a:srgbClr>
-                </a:solidFill>
-              </a:ln>
-              <a:solidFill>
-                <a:srgbClr val="E6005D"/>
-              </a:solidFill>
-              <a:latin typeface="08서울한강체 M" pitchFamily="18" charset="-127"/>
-              <a:ea typeface="08서울한강체 M" pitchFamily="18" charset="-127"/>
-            </a:endParaRPr>
           </a:p>
         </p:txBody>
       </p:sp>
@@ -6083,7 +6035,7 @@
           <p:nvPr>
             <p:extLst>
               <p:ext uri="{D42A27DB-BD31-4B8C-83A1-F6EECF244321}">
-                <p14:modId xmlns:p14="http://schemas.microsoft.com/office/powerpoint/2010/main" xmlns="" val="1524938934"/>
+                <p14:modId xmlns="" xmlns:p14="http://schemas.microsoft.com/office/powerpoint/2010/main" val="1524938934"/>
               </p:ext>
             </p:extLst>
           </p:nvPr>
@@ -7864,7 +7816,7 @@
           <p:nvPr>
             <p:extLst>
               <p:ext uri="{D42A27DB-BD31-4B8C-83A1-F6EECF244321}">
-                <p14:modId xmlns:p14="http://schemas.microsoft.com/office/powerpoint/2010/main" xmlns="" val="1524938934"/>
+                <p14:modId xmlns="" xmlns:p14="http://schemas.microsoft.com/office/powerpoint/2010/main" val="1524938934"/>
               </p:ext>
             </p:extLst>
           </p:nvPr>
@@ -10231,6 +10183,32 @@
           </a:p>
         </p:txBody>
       </p:sp>
+      <p:pic>
+        <p:nvPicPr>
+          <p:cNvPr id="1026" name="Picture 2" descr="C:\Users\OEM\Desktop\캡처.PNG"/>
+          <p:cNvPicPr>
+            <a:picLocks noChangeAspect="1" noChangeArrowheads="1"/>
+          </p:cNvPicPr>
+          <p:nvPr/>
+        </p:nvPicPr>
+        <p:blipFill>
+          <a:blip r:embed="rId2"/>
+          <a:srcRect/>
+          <a:stretch>
+            <a:fillRect/>
+          </a:stretch>
+        </p:blipFill>
+        <p:spPr bwMode="auto">
+          <a:xfrm>
+            <a:off x="785786" y="1214422"/>
+            <a:ext cx="7643866" cy="4791075"/>
+          </a:xfrm>
+          <a:prstGeom prst="rect">
+            <a:avLst/>
+          </a:prstGeom>
+          <a:noFill/>
+        </p:spPr>
+      </p:pic>
     </p:spTree>
   </p:cSld>
   <p:clrMapOvr>
@@ -10332,7 +10310,7 @@
           <p:nvPr>
             <p:extLst>
               <p:ext uri="{D42A27DB-BD31-4B8C-83A1-F6EECF244321}">
-                <p14:modId xmlns:p14="http://schemas.microsoft.com/office/powerpoint/2010/main" xmlns="" val="136084941"/>
+                <p14:modId xmlns="" xmlns:p14="http://schemas.microsoft.com/office/powerpoint/2010/main" val="136084941"/>
               </p:ext>
             </p:extLst>
           </p:nvPr>

</xml_diff>